<commit_message>
Update to 2.2 and 2.3
Copied over 2.3 info from my comp and added LIDAR and Occultation
sections draft. Additionial figures added.
</commit_message>
<xml_diff>
--- a/RawImageFiles/LidarGeometry.pptx
+++ b/RawImageFiles/LidarGeometry.pptx
@@ -304,7 +304,7 @@
           <a:p>
             <a:fld id="{9BA332CA-9A9B-46E9-83A7-3E0A2F395768}" type="datetimeFigureOut">
               <a:rPr lang="en-CA" smtClean="0"/>
-              <a:t>03/03/2015</a:t>
+              <a:t>04/03/2015</a:t>
             </a:fld>
             <a:endParaRPr lang="en-CA"/>
           </a:p>
@@ -474,7 +474,7 @@
           <a:p>
             <a:fld id="{9BA332CA-9A9B-46E9-83A7-3E0A2F395768}" type="datetimeFigureOut">
               <a:rPr lang="en-CA" smtClean="0"/>
-              <a:t>03/03/2015</a:t>
+              <a:t>04/03/2015</a:t>
             </a:fld>
             <a:endParaRPr lang="en-CA"/>
           </a:p>
@@ -654,7 +654,7 @@
           <a:p>
             <a:fld id="{9BA332CA-9A9B-46E9-83A7-3E0A2F395768}" type="datetimeFigureOut">
               <a:rPr lang="en-CA" smtClean="0"/>
-              <a:t>03/03/2015</a:t>
+              <a:t>04/03/2015</a:t>
             </a:fld>
             <a:endParaRPr lang="en-CA"/>
           </a:p>
@@ -824,7 +824,7 @@
           <a:p>
             <a:fld id="{9BA332CA-9A9B-46E9-83A7-3E0A2F395768}" type="datetimeFigureOut">
               <a:rPr lang="en-CA" smtClean="0"/>
-              <a:t>03/03/2015</a:t>
+              <a:t>04/03/2015</a:t>
             </a:fld>
             <a:endParaRPr lang="en-CA"/>
           </a:p>
@@ -1070,7 +1070,7 @@
           <a:p>
             <a:fld id="{9BA332CA-9A9B-46E9-83A7-3E0A2F395768}" type="datetimeFigureOut">
               <a:rPr lang="en-CA" smtClean="0"/>
-              <a:t>03/03/2015</a:t>
+              <a:t>04/03/2015</a:t>
             </a:fld>
             <a:endParaRPr lang="en-CA"/>
           </a:p>
@@ -1358,7 +1358,7 @@
           <a:p>
             <a:fld id="{9BA332CA-9A9B-46E9-83A7-3E0A2F395768}" type="datetimeFigureOut">
               <a:rPr lang="en-CA" smtClean="0"/>
-              <a:t>03/03/2015</a:t>
+              <a:t>04/03/2015</a:t>
             </a:fld>
             <a:endParaRPr lang="en-CA"/>
           </a:p>
@@ -1780,7 +1780,7 @@
           <a:p>
             <a:fld id="{9BA332CA-9A9B-46E9-83A7-3E0A2F395768}" type="datetimeFigureOut">
               <a:rPr lang="en-CA" smtClean="0"/>
-              <a:t>03/03/2015</a:t>
+              <a:t>04/03/2015</a:t>
             </a:fld>
             <a:endParaRPr lang="en-CA"/>
           </a:p>
@@ -1898,7 +1898,7 @@
           <a:p>
             <a:fld id="{9BA332CA-9A9B-46E9-83A7-3E0A2F395768}" type="datetimeFigureOut">
               <a:rPr lang="en-CA" smtClean="0"/>
-              <a:t>03/03/2015</a:t>
+              <a:t>04/03/2015</a:t>
             </a:fld>
             <a:endParaRPr lang="en-CA"/>
           </a:p>
@@ -1993,7 +1993,7 @@
           <a:p>
             <a:fld id="{9BA332CA-9A9B-46E9-83A7-3E0A2F395768}" type="datetimeFigureOut">
               <a:rPr lang="en-CA" smtClean="0"/>
-              <a:t>03/03/2015</a:t>
+              <a:t>04/03/2015</a:t>
             </a:fld>
             <a:endParaRPr lang="en-CA"/>
           </a:p>
@@ -2270,7 +2270,7 @@
           <a:p>
             <a:fld id="{9BA332CA-9A9B-46E9-83A7-3E0A2F395768}" type="datetimeFigureOut">
               <a:rPr lang="en-CA" smtClean="0"/>
-              <a:t>03/03/2015</a:t>
+              <a:t>04/03/2015</a:t>
             </a:fld>
             <a:endParaRPr lang="en-CA"/>
           </a:p>
@@ -2523,7 +2523,7 @@
           <a:p>
             <a:fld id="{9BA332CA-9A9B-46E9-83A7-3E0A2F395768}" type="datetimeFigureOut">
               <a:rPr lang="en-CA" smtClean="0"/>
-              <a:t>03/03/2015</a:t>
+              <a:t>04/03/2015</a:t>
             </a:fld>
             <a:endParaRPr lang="en-CA"/>
           </a:p>
@@ -2736,7 +2736,7 @@
           <a:p>
             <a:fld id="{9BA332CA-9A9B-46E9-83A7-3E0A2F395768}" type="datetimeFigureOut">
               <a:rPr lang="en-CA" smtClean="0"/>
-              <a:t>03/03/2015</a:t>
+              <a:t>04/03/2015</a:t>
             </a:fld>
             <a:endParaRPr lang="en-CA"/>
           </a:p>
@@ -3504,7 +3504,6 @@
               <a:rPr lang="en-CA" sz="1600" dirty="0" smtClean="0"/>
               <a:t>Nadir</a:t>
             </a:r>
-            <a:endParaRPr lang="en-CA" sz="1600" dirty="0" smtClean="0"/>
           </a:p>
         </p:txBody>
       </p:sp>
@@ -3556,7 +3555,8 @@
             <a:avLst/>
           </a:prstGeom>
           <a:ln>
-            <a:tailEnd type="triangle"/>
+            <a:headEnd type="triangle" w="med" len="med"/>
+            <a:tailEnd type="none" w="med" len="med"/>
           </a:ln>
         </p:spPr>
         <p:style>
@@ -3591,7 +3591,8 @@
             <a:avLst/>
           </a:prstGeom>
           <a:ln>
-            <a:tailEnd type="triangle"/>
+            <a:headEnd type="triangle" w="med" len="med"/>
+            <a:tailEnd type="none" w="med" len="med"/>
           </a:ln>
         </p:spPr>
         <p:style>
@@ -3635,7 +3636,6 @@
               <a:rPr lang="en-CA" sz="1600" dirty="0" smtClean="0"/>
               <a:t>Off-Nadir</a:t>
             </a:r>
-            <a:endParaRPr lang="en-CA" sz="1600" dirty="0" smtClean="0"/>
           </a:p>
         </p:txBody>
       </p:sp>

</xml_diff>